<commit_message>
Refactor code structure for improved readability and maintainability
</commit_message>
<xml_diff>
--- a/Presentation - Data Analyst Certification.pptx
+++ b/Presentation - Data Analyst Certification.pptx
@@ -5374,7 +5374,7 @@
                 <a:cs typeface="Open Sauce"/>
                 <a:sym typeface="Open Sauce"/>
               </a:rPr>
-              <a:t>, generating a great total revenue through volume, though with lower value per customer.</a:t>
+              <a:t>, generating a great total revenue through volume, but have a lower value per customer.</a:t>
             </a:r>
           </a:p>
           <a:p>
@@ -5457,16 +5457,28 @@
               <a:buChar char="•"/>
             </a:pPr>
             <a:r>
-              <a:rPr lang="en-US" sz="2000">
-                <a:solidFill>
-                  <a:srgbClr val="000000"/>
-                </a:solidFill>
-                <a:latin typeface="Open Sauce"/>
-                <a:ea typeface="Open Sauce"/>
-                <a:cs typeface="Open Sauce"/>
-                <a:sym typeface="Open Sauce"/>
-              </a:rPr>
-              <a:t>Email and Call achieved the </a:t>
+              <a:rPr lang="en-US" b="true" sz="2000">
+                <a:solidFill>
+                  <a:srgbClr val="000000"/>
+                </a:solidFill>
+                <a:latin typeface="Open Sauce Bold"/>
+                <a:ea typeface="Open Sauce Bold"/>
+                <a:cs typeface="Open Sauce Bold"/>
+                <a:sym typeface="Open Sauce Bold"/>
+              </a:rPr>
+              <a:t>Email + Call</a:t>
+            </a:r>
+            <a:r>
+              <a:rPr lang="en-US" sz="2000">
+                <a:solidFill>
+                  <a:srgbClr val="000000"/>
+                </a:solidFill>
+                <a:latin typeface="Open Sauce"/>
+                <a:ea typeface="Open Sauce"/>
+                <a:cs typeface="Open Sauce"/>
+                <a:sym typeface="Open Sauce"/>
+              </a:rPr>
+              <a:t> achieved the </a:t>
             </a:r>
             <a:r>
               <a:rPr lang="en-US" b="true" sz="2000">
@@ -9969,7 +9981,7 @@
                 <a:cs typeface="Open Sauce"/>
                 <a:sym typeface="Open Sauce"/>
               </a:rPr>
-              <a:t> We’ll seek to better understand this dynamic in the next steps of our analysis.</a:t>
+              <a:t> We’ll seek to better understand this dynamic later in our analysis.</a:t>
             </a:r>
           </a:p>
         </p:txBody>
@@ -10427,7 +10439,7 @@
                 <a:cs typeface="Open Sauce Bold"/>
                 <a:sym typeface="Open Sauce Bold"/>
               </a:rPr>
-              <a:t>ever, the revenue trend does not mirror the customer acquisition curve.</a:t>
+              <a:t>ever, the revenue trend does not fit the customer acquisition pattern.</a:t>
             </a:r>
           </a:p>
         </p:txBody>
@@ -10660,7 +10672,7 @@
                 <a:cs typeface="Open Sauce"/>
                 <a:sym typeface="Open Sauce"/>
               </a:rPr>
-              <a:t>Looking at how revenue evolved over time — but this time broken down by sales method — we begin to resolve part of our earlier question. The mismatch between customer acquisition and total revenue now appears to be driven by the Email+Call method.</a:t>
+              <a:t>Looking again at how revenue evolved over time — but this time broken down by sales method — we begin to solve part of our earlier question. The mismatch between customer acquisition and total revenue now appears to be driven by the Email+Call method.</a:t>
             </a:r>
           </a:p>
         </p:txBody>
@@ -10703,7 +10715,7 @@
                 <a:cs typeface="Open Sauce Bold"/>
                 <a:sym typeface="Open Sauce Bold"/>
               </a:rPr>
-              <a:t>So while Email brought the most customers, it’s Email+Call that ultimately generated the most revenue in the final stages of the campaign.</a:t>
+              <a:t>So while Email brought the most customers, it is Email+Call that ultimately generated the most revenue in the final stages of the campaign.</a:t>
             </a:r>
           </a:p>
         </p:txBody>
@@ -11385,7 +11397,7 @@
                 <a:cs typeface="Open Sauce"/>
                 <a:sym typeface="Open Sauce"/>
               </a:rPr>
-              <a:t>Continuing our earlier investigation,  we can clearly see from the focus on average revenue per customer that</a:t>
+              <a:t>Continuing our investigation,  we can clearly see from the focus on average revenue per customer that</a:t>
             </a:r>
           </a:p>
         </p:txBody>
@@ -12257,7 +12269,7 @@
                 <a:cs typeface="Open Sauce"/>
                 <a:sym typeface="Open Sauce"/>
               </a:rPr>
-              <a:t>ate. These are high-volume markets where reach drives performance more than individual value.</a:t>
+              <a:t>ate. These are high-volume markets where reach, drives performance more than individual value.</a:t>
             </a:r>
           </a:p>
           <a:p>
@@ -12405,7 +12417,7 @@
                 <a:cs typeface="Open Sauce"/>
                 <a:sym typeface="Open Sauce"/>
               </a:rPr>
-              <a:t>show the highest average revenue per client despite limited customer bases. These regions reflect high-value engagements, possibly more suited for resource-intensive methods like Email and Call.</a:t>
+              <a:t>show the highest average revenue per client despite limited customer bases. These regions reflect high-value engagements, possibly more suited for resource-intensive methods like Email + Call.</a:t>
             </a:r>
           </a:p>
         </p:txBody>
@@ -13110,7 +13122,7 @@
                 <a:cs typeface="Open Sauce"/>
                 <a:sym typeface="Open Sauce"/>
               </a:rPr>
-              <a:t>To monitor performance over time, the business needs a metric that reflects both the financial return and the operational effort required by each sales method.  Based on the analyses, two complementary indicators emerge as relevant for evaluating campaign efficiency.</a:t>
+              <a:t>To monitor performance over time, the company needs a metric that reflects both the financial return and the operational effort required by each sales method.  Based on the analyses, two complementary indicators emerge as relevant for evaluating campaign efficiency.</a:t>
             </a:r>
           </a:p>
           <a:p>

</xml_diff>